<commit_message>
Added problem to section 8.1
Added problem to section 8.1 also replaced pdfs in 1.6
</commit_message>
<xml_diff>
--- a/Lecture Slides/VideoLectureSlides/8.1.pptx
+++ b/Lecture Slides/VideoLectureSlides/8.1.pptx
@@ -5,7 +5,7 @@
     <p:sldMasterId id="2147483660" r:id="rId4"/>
   </p:sldMasterIdLst>
   <p:notesMasterIdLst>
-    <p:notesMasterId r:id="rId18"/>
+    <p:notesMasterId r:id="rId19"/>
   </p:notesMasterIdLst>
   <p:sldIdLst>
     <p:sldId id="256" r:id="rId5"/>
@@ -20,7 +20,8 @@
     <p:sldId id="267" r:id="rId14"/>
     <p:sldId id="273" r:id="rId15"/>
     <p:sldId id="268" r:id="rId16"/>
-    <p:sldId id="274" r:id="rId17"/>
+    <p:sldId id="288" r:id="rId17"/>
+    <p:sldId id="274" r:id="rId18"/>
   </p:sldIdLst>
   <p:sldSz cx="9144000" cy="6858000" type="screen4x3"/>
   <p:notesSz cx="6858000" cy="9144000"/>
@@ -234,7 +235,7 @@
           <a:p>
             <a:fld id="{1AA1AB63-216F-4D5B-8811-CCB935E98D4A}" type="datetimeFigureOut">
               <a:rPr lang="en-US" smtClean="0"/>
-              <a:t>12/22/2020</a:t>
+              <a:t>8/23/2022</a:t>
             </a:fld>
             <a:endParaRPr lang="en-US"/>
           </a:p>
@@ -4299,6 +4300,655 @@
 </file>
 
 <file path=ppt/slides/slide13.xml><?xml version="1.0" encoding="utf-8"?>
+<p:sld xmlns:a="http://schemas.openxmlformats.org/drawingml/2006/main" xmlns:r="http://schemas.openxmlformats.org/officeDocument/2006/relationships" xmlns:p="http://schemas.openxmlformats.org/presentationml/2006/main">
+  <p:cSld>
+    <p:spTree>
+      <p:nvGrpSpPr>
+        <p:cNvPr id="1" name=""/>
+        <p:cNvGrpSpPr/>
+        <p:nvPr/>
+      </p:nvGrpSpPr>
+      <p:grpSpPr>
+        <a:xfrm>
+          <a:off x="0" y="0"/>
+          <a:ext cx="0" cy="0"/>
+          <a:chOff x="0" y="0"/>
+          <a:chExt cx="0" cy="0"/>
+        </a:xfrm>
+      </p:grpSpPr>
+      <p:sp>
+        <p:nvSpPr>
+          <p:cNvPr id="2" name="Title 1"/>
+          <p:cNvSpPr>
+            <a:spLocks noGrp="1"/>
+          </p:cNvSpPr>
+          <p:nvPr>
+            <p:ph type="title"/>
+          </p:nvPr>
+        </p:nvSpPr>
+        <p:spPr/>
+        <p:txBody>
+          <a:bodyPr/>
+          <a:lstStyle/>
+          <a:p>
+            <a:r>
+              <a:rPr lang="en-US"/>
+              <a:t>Worked Example</a:t>
+            </a:r>
+            <a:endParaRPr lang="en-US" dirty="0"/>
+          </a:p>
+        </p:txBody>
+      </p:sp>
+      <p:sp>
+        <p:nvSpPr>
+          <p:cNvPr id="3" name="Content Placeholder 2"/>
+          <p:cNvSpPr>
+            <a:spLocks noGrp="1"/>
+          </p:cNvSpPr>
+          <p:nvPr>
+            <p:ph idx="1"/>
+          </p:nvPr>
+        </p:nvSpPr>
+        <p:spPr>
+          <a:xfrm>
+            <a:off x="457200" y="1600200"/>
+            <a:ext cx="4114800" cy="4756149"/>
+          </a:xfrm>
+        </p:spPr>
+        <p:txBody>
+          <a:bodyPr>
+            <a:normAutofit fontScale="85000" lnSpcReduction="20000"/>
+          </a:bodyPr>
+          <a:lstStyle/>
+          <a:p>
+            <a:r>
+              <a:rPr lang="en-US" dirty="0"/>
+              <a:t>An object is released from rest at the top of a tall building of unknown height. Using a precision stopwatch, you note that it takes 2.5 seconds for the object to hit the ground. Assuming the standard rate of acceleration of 32.2 ft/s</a:t>
+            </a:r>
+            <a:r>
+              <a:rPr lang="en-US" baseline="30000" dirty="0"/>
+              <a:t>2</a:t>
+            </a:r>
+            <a:r>
+              <a:rPr lang="en-US" dirty="0"/>
+              <a:t> and negligible air resistance, what is the estimated height of the building in feet?</a:t>
+            </a:r>
+          </a:p>
+        </p:txBody>
+      </p:sp>
+      <p:sp>
+        <p:nvSpPr>
+          <p:cNvPr id="5" name="Rectangle 4">
+            <a:extLst>
+              <a:ext uri="{FF2B5EF4-FFF2-40B4-BE49-F238E27FC236}">
+                <a16:creationId xmlns:a16="http://schemas.microsoft.com/office/drawing/2014/main" id="{8BB5167E-2DF2-45F2-AED9-25EB9B110C7E}"/>
+              </a:ext>
+            </a:extLst>
+          </p:cNvPr>
+          <p:cNvSpPr/>
+          <p:nvPr/>
+        </p:nvSpPr>
+        <p:spPr>
+          <a:xfrm>
+            <a:off x="8077200" y="1981200"/>
+            <a:ext cx="1066800" cy="4375149"/>
+          </a:xfrm>
+          <a:prstGeom prst="rect">
+            <a:avLst/>
+          </a:prstGeom>
+          <a:solidFill>
+            <a:schemeClr val="bg1">
+              <a:lumMod val="75000"/>
+            </a:schemeClr>
+          </a:solidFill>
+          <a:ln>
+            <a:solidFill>
+              <a:schemeClr val="tx1">
+                <a:lumMod val="95000"/>
+                <a:lumOff val="5000"/>
+              </a:schemeClr>
+            </a:solidFill>
+          </a:ln>
+        </p:spPr>
+        <p:style>
+          <a:lnRef idx="2">
+            <a:schemeClr val="accent1">
+              <a:shade val="50000"/>
+            </a:schemeClr>
+          </a:lnRef>
+          <a:fillRef idx="1">
+            <a:schemeClr val="accent1"/>
+          </a:fillRef>
+          <a:effectRef idx="0">
+            <a:schemeClr val="accent1"/>
+          </a:effectRef>
+          <a:fontRef idx="minor">
+            <a:schemeClr val="lt1"/>
+          </a:fontRef>
+        </p:style>
+        <p:txBody>
+          <a:bodyPr rtlCol="0" anchor="ctr"/>
+          <a:lstStyle/>
+          <a:p>
+            <a:pPr algn="ctr"/>
+            <a:endParaRPr lang="en-US"/>
+          </a:p>
+        </p:txBody>
+      </p:sp>
+      <p:sp>
+        <p:nvSpPr>
+          <p:cNvPr id="7" name="Rectangle 6">
+            <a:extLst>
+              <a:ext uri="{FF2B5EF4-FFF2-40B4-BE49-F238E27FC236}">
+                <a16:creationId xmlns:a16="http://schemas.microsoft.com/office/drawing/2014/main" id="{CE5F1393-E6F0-4784-9975-1F1CB1F89FCF}"/>
+              </a:ext>
+            </a:extLst>
+          </p:cNvPr>
+          <p:cNvSpPr/>
+          <p:nvPr/>
+        </p:nvSpPr>
+        <p:spPr>
+          <a:xfrm>
+            <a:off x="5410200" y="6356349"/>
+            <a:ext cx="3733800" cy="501651"/>
+          </a:xfrm>
+          <a:prstGeom prst="rect">
+            <a:avLst/>
+          </a:prstGeom>
+          <a:solidFill>
+            <a:schemeClr val="tx1">
+              <a:lumMod val="65000"/>
+              <a:lumOff val="35000"/>
+            </a:schemeClr>
+          </a:solidFill>
+        </p:spPr>
+        <p:style>
+          <a:lnRef idx="2">
+            <a:schemeClr val="dk1">
+              <a:shade val="50000"/>
+            </a:schemeClr>
+          </a:lnRef>
+          <a:fillRef idx="1">
+            <a:schemeClr val="dk1"/>
+          </a:fillRef>
+          <a:effectRef idx="0">
+            <a:schemeClr val="dk1"/>
+          </a:effectRef>
+          <a:fontRef idx="minor">
+            <a:schemeClr val="lt1"/>
+          </a:fontRef>
+        </p:style>
+        <p:txBody>
+          <a:bodyPr rtlCol="0" anchor="ctr"/>
+          <a:lstStyle/>
+          <a:p>
+            <a:pPr algn="ctr"/>
+            <a:endParaRPr lang="en-US"/>
+          </a:p>
+        </p:txBody>
+      </p:sp>
+      <p:sp>
+        <p:nvSpPr>
+          <p:cNvPr id="8" name="Rectangle 7">
+            <a:extLst>
+              <a:ext uri="{FF2B5EF4-FFF2-40B4-BE49-F238E27FC236}">
+                <a16:creationId xmlns:a16="http://schemas.microsoft.com/office/drawing/2014/main" id="{C5CC4FAA-B60D-4184-811A-B3EF8B4C2457}"/>
+              </a:ext>
+            </a:extLst>
+          </p:cNvPr>
+          <p:cNvSpPr/>
+          <p:nvPr/>
+        </p:nvSpPr>
+        <p:spPr>
+          <a:xfrm>
+            <a:off x="7924800" y="1479549"/>
+            <a:ext cx="1219200" cy="501651"/>
+          </a:xfrm>
+          <a:prstGeom prst="rect">
+            <a:avLst/>
+          </a:prstGeom>
+          <a:solidFill>
+            <a:schemeClr val="tx1">
+              <a:lumMod val="65000"/>
+              <a:lumOff val="35000"/>
+            </a:schemeClr>
+          </a:solidFill>
+        </p:spPr>
+        <p:style>
+          <a:lnRef idx="2">
+            <a:schemeClr val="accent1">
+              <a:shade val="50000"/>
+            </a:schemeClr>
+          </a:lnRef>
+          <a:fillRef idx="1">
+            <a:schemeClr val="accent1"/>
+          </a:fillRef>
+          <a:effectRef idx="0">
+            <a:schemeClr val="accent1"/>
+          </a:effectRef>
+          <a:fontRef idx="minor">
+            <a:schemeClr val="lt1"/>
+          </a:fontRef>
+        </p:style>
+        <p:txBody>
+          <a:bodyPr rtlCol="0" anchor="ctr"/>
+          <a:lstStyle/>
+          <a:p>
+            <a:pPr algn="ctr"/>
+            <a:endParaRPr lang="en-US"/>
+          </a:p>
+        </p:txBody>
+      </p:sp>
+      <p:sp>
+        <p:nvSpPr>
+          <p:cNvPr id="9" name="Oval 8">
+            <a:extLst>
+              <a:ext uri="{FF2B5EF4-FFF2-40B4-BE49-F238E27FC236}">
+                <a16:creationId xmlns:a16="http://schemas.microsoft.com/office/drawing/2014/main" id="{55B5F87B-5D1E-46EE-8DFD-290199DED587}"/>
+              </a:ext>
+            </a:extLst>
+          </p:cNvPr>
+          <p:cNvSpPr/>
+          <p:nvPr/>
+        </p:nvSpPr>
+        <p:spPr>
+          <a:xfrm>
+            <a:off x="6705600" y="1409700"/>
+            <a:ext cx="381000" cy="381000"/>
+          </a:xfrm>
+          <a:prstGeom prst="ellipse">
+            <a:avLst/>
+          </a:prstGeom>
+        </p:spPr>
+        <p:style>
+          <a:lnRef idx="2">
+            <a:schemeClr val="accent1">
+              <a:shade val="50000"/>
+            </a:schemeClr>
+          </a:lnRef>
+          <a:fillRef idx="1">
+            <a:schemeClr val="accent1"/>
+          </a:fillRef>
+          <a:effectRef idx="0">
+            <a:schemeClr val="accent1"/>
+          </a:effectRef>
+          <a:fontRef idx="minor">
+            <a:schemeClr val="lt1"/>
+          </a:fontRef>
+        </p:style>
+        <p:txBody>
+          <a:bodyPr rtlCol="0" anchor="ctr"/>
+          <a:lstStyle/>
+          <a:p>
+            <a:pPr algn="ctr"/>
+            <a:endParaRPr lang="en-US"/>
+          </a:p>
+        </p:txBody>
+      </p:sp>
+      <p:cxnSp>
+        <p:nvCxnSpPr>
+          <p:cNvPr id="11" name="Straight Arrow Connector 10">
+            <a:extLst>
+              <a:ext uri="{FF2B5EF4-FFF2-40B4-BE49-F238E27FC236}">
+                <a16:creationId xmlns:a16="http://schemas.microsoft.com/office/drawing/2014/main" id="{4ADC763E-5569-4979-A1F1-1590623AC9C1}"/>
+              </a:ext>
+            </a:extLst>
+          </p:cNvPr>
+          <p:cNvCxnSpPr>
+            <a:cxnSpLocks/>
+          </p:cNvCxnSpPr>
+          <p:nvPr/>
+        </p:nvCxnSpPr>
+        <p:spPr>
+          <a:xfrm>
+            <a:off x="6896100" y="1905000"/>
+            <a:ext cx="0" cy="4191000"/>
+          </a:xfrm>
+          <a:prstGeom prst="straightConnector1">
+            <a:avLst/>
+          </a:prstGeom>
+          <a:ln>
+            <a:tailEnd type="triangle"/>
+          </a:ln>
+        </p:spPr>
+        <p:style>
+          <a:lnRef idx="1">
+            <a:schemeClr val="accent1"/>
+          </a:lnRef>
+          <a:fillRef idx="0">
+            <a:schemeClr val="accent1"/>
+          </a:fillRef>
+          <a:effectRef idx="0">
+            <a:schemeClr val="accent1"/>
+          </a:effectRef>
+          <a:fontRef idx="minor">
+            <a:schemeClr val="tx1"/>
+          </a:fontRef>
+        </p:style>
+      </p:cxnSp>
+      <p:cxnSp>
+        <p:nvCxnSpPr>
+          <p:cNvPr id="14" name="Straight Connector 13">
+            <a:extLst>
+              <a:ext uri="{FF2B5EF4-FFF2-40B4-BE49-F238E27FC236}">
+                <a16:creationId xmlns:a16="http://schemas.microsoft.com/office/drawing/2014/main" id="{B5AE1052-CB93-46BA-9288-4D9776F10D73}"/>
+              </a:ext>
+            </a:extLst>
+          </p:cNvPr>
+          <p:cNvCxnSpPr/>
+          <p:nvPr/>
+        </p:nvCxnSpPr>
+        <p:spPr>
+          <a:xfrm>
+            <a:off x="5562600" y="1600200"/>
+            <a:ext cx="838200" cy="0"/>
+          </a:xfrm>
+          <a:prstGeom prst="line">
+            <a:avLst/>
+          </a:prstGeom>
+        </p:spPr>
+        <p:style>
+          <a:lnRef idx="1">
+            <a:schemeClr val="accent1"/>
+          </a:lnRef>
+          <a:fillRef idx="0">
+            <a:schemeClr val="accent1"/>
+          </a:fillRef>
+          <a:effectRef idx="0">
+            <a:schemeClr val="accent1"/>
+          </a:effectRef>
+          <a:fontRef idx="minor">
+            <a:schemeClr val="tx1"/>
+          </a:fontRef>
+        </p:style>
+      </p:cxnSp>
+      <p:cxnSp>
+        <p:nvCxnSpPr>
+          <p:cNvPr id="15" name="Straight Connector 14">
+            <a:extLst>
+              <a:ext uri="{FF2B5EF4-FFF2-40B4-BE49-F238E27FC236}">
+                <a16:creationId xmlns:a16="http://schemas.microsoft.com/office/drawing/2014/main" id="{0DB71824-C479-4CE1-8FA4-DE0D3D62B4A5}"/>
+              </a:ext>
+            </a:extLst>
+          </p:cNvPr>
+          <p:cNvCxnSpPr>
+            <a:cxnSpLocks/>
+          </p:cNvCxnSpPr>
+          <p:nvPr/>
+        </p:nvCxnSpPr>
+        <p:spPr>
+          <a:xfrm>
+            <a:off x="6019800" y="1600200"/>
+            <a:ext cx="0" cy="4756149"/>
+          </a:xfrm>
+          <a:prstGeom prst="line">
+            <a:avLst/>
+          </a:prstGeom>
+        </p:spPr>
+        <p:style>
+          <a:lnRef idx="1">
+            <a:schemeClr val="accent1"/>
+          </a:lnRef>
+          <a:fillRef idx="0">
+            <a:schemeClr val="accent1"/>
+          </a:fillRef>
+          <a:effectRef idx="0">
+            <a:schemeClr val="accent1"/>
+          </a:effectRef>
+          <a:fontRef idx="minor">
+            <a:schemeClr val="tx1"/>
+          </a:fontRef>
+        </p:style>
+      </p:cxnSp>
+      <mc:AlternateContent xmlns:mc="http://schemas.openxmlformats.org/markup-compatibility/2006">
+        <mc:Choice xmlns:a14="http://schemas.microsoft.com/office/drawing/2010/main" Requires="a14">
+          <p:sp>
+            <p:nvSpPr>
+              <p:cNvPr id="18" name="TextBox 17">
+                <a:extLst>
+                  <a:ext uri="{FF2B5EF4-FFF2-40B4-BE49-F238E27FC236}">
+                    <a16:creationId xmlns:a16="http://schemas.microsoft.com/office/drawing/2014/main" id="{4D774B48-30D4-4277-85A2-B3234D151409}"/>
+                  </a:ext>
+                </a:extLst>
+              </p:cNvPr>
+              <p:cNvSpPr txBox="1"/>
+              <p:nvPr/>
+            </p:nvSpPr>
+            <p:spPr>
+              <a:xfrm>
+                <a:off x="5676899" y="3919577"/>
+                <a:ext cx="704808" cy="369332"/>
+              </a:xfrm>
+              <a:prstGeom prst="rect">
+                <a:avLst/>
+              </a:prstGeom>
+              <a:solidFill>
+                <a:schemeClr val="bg1"/>
+              </a:solidFill>
+            </p:spPr>
+            <p:txBody>
+              <a:bodyPr wrap="none" rtlCol="0">
+                <a:spAutoFit/>
+              </a:bodyPr>
+              <a:lstStyle/>
+              <a:p>
+                <a14:m>
+                  <m:oMathPara xmlns:m="http://schemas.openxmlformats.org/officeDocument/2006/math">
+                    <m:oMathParaPr>
+                      <m:jc m:val="centerGroup"/>
+                    </m:oMathParaPr>
+                    <m:oMath xmlns:m="http://schemas.openxmlformats.org/officeDocument/2006/math">
+                      <m:r>
+                        <a:rPr lang="en-US" i="1" dirty="0" smtClean="0">
+                          <a:solidFill>
+                            <a:schemeClr val="tx2"/>
+                          </a:solidFill>
+                          <a:latin typeface="Cambria Math" panose="02040503050406030204" pitchFamily="18" charset="0"/>
+                        </a:rPr>
+                        <m:t>h</m:t>
+                      </m:r>
+                      <m:r>
+                        <a:rPr lang="en-US" i="1" dirty="0" smtClean="0">
+                          <a:solidFill>
+                            <a:schemeClr val="tx2"/>
+                          </a:solidFill>
+                          <a:latin typeface="Cambria Math" panose="02040503050406030204" pitchFamily="18" charset="0"/>
+                        </a:rPr>
+                        <m:t>=?</m:t>
+                      </m:r>
+                    </m:oMath>
+                  </m:oMathPara>
+                </a14:m>
+                <a:endParaRPr lang="en-US" dirty="0">
+                  <a:solidFill>
+                    <a:schemeClr val="tx2"/>
+                  </a:solidFill>
+                </a:endParaRPr>
+              </a:p>
+            </p:txBody>
+          </p:sp>
+        </mc:Choice>
+        <mc:Fallback>
+          <p:sp>
+            <p:nvSpPr>
+              <p:cNvPr id="18" name="TextBox 17">
+                <a:extLst>
+                  <a:ext uri="{FF2B5EF4-FFF2-40B4-BE49-F238E27FC236}">
+                    <a16:creationId xmlns:a16="http://schemas.microsoft.com/office/drawing/2014/main" id="{4D774B48-30D4-4277-85A2-B3234D151409}"/>
+                  </a:ext>
+                </a:extLst>
+              </p:cNvPr>
+              <p:cNvSpPr txBox="1">
+                <a:spLocks noRot="1" noChangeAspect="1" noMove="1" noResize="1" noEditPoints="1" noAdjustHandles="1" noChangeArrowheads="1" noChangeShapeType="1" noTextEdit="1"/>
+              </p:cNvSpPr>
+              <p:nvPr/>
+            </p:nvSpPr>
+            <p:spPr>
+              <a:xfrm>
+                <a:off x="5676899" y="3919577"/>
+                <a:ext cx="704808" cy="369332"/>
+              </a:xfrm>
+              <a:prstGeom prst="rect">
+                <a:avLst/>
+              </a:prstGeom>
+              <a:blipFill>
+                <a:blip r:embed="rId2"/>
+                <a:stretch>
+                  <a:fillRect/>
+                </a:stretch>
+              </a:blipFill>
+            </p:spPr>
+            <p:txBody>
+              <a:bodyPr/>
+              <a:lstStyle/>
+              <a:p>
+                <a:r>
+                  <a:rPr lang="en-US">
+                    <a:noFill/>
+                  </a:rPr>
+                  <a:t> </a:t>
+                </a:r>
+              </a:p>
+            </p:txBody>
+          </p:sp>
+        </mc:Fallback>
+      </mc:AlternateContent>
+      <mc:AlternateContent xmlns:mc="http://schemas.openxmlformats.org/markup-compatibility/2006">
+        <mc:Choice xmlns:a14="http://schemas.microsoft.com/office/drawing/2010/main" Requires="a14">
+          <p:sp>
+            <p:nvSpPr>
+              <p:cNvPr id="19" name="TextBox 18">
+                <a:extLst>
+                  <a:ext uri="{FF2B5EF4-FFF2-40B4-BE49-F238E27FC236}">
+                    <a16:creationId xmlns:a16="http://schemas.microsoft.com/office/drawing/2014/main" id="{BF8A204D-F0B1-45A1-A867-35EEC9A95509}"/>
+                  </a:ext>
+                </a:extLst>
+              </p:cNvPr>
+              <p:cNvSpPr txBox="1"/>
+              <p:nvPr/>
+            </p:nvSpPr>
+            <p:spPr>
+              <a:xfrm>
+                <a:off x="6381750" y="3912710"/>
+                <a:ext cx="1052660" cy="369332"/>
+              </a:xfrm>
+              <a:prstGeom prst="rect">
+                <a:avLst/>
+              </a:prstGeom>
+              <a:solidFill>
+                <a:schemeClr val="bg1"/>
+              </a:solidFill>
+            </p:spPr>
+            <p:txBody>
+              <a:bodyPr wrap="none" rtlCol="0">
+                <a:spAutoFit/>
+              </a:bodyPr>
+              <a:lstStyle/>
+              <a:p>
+                <a14:m>
+                  <m:oMathPara xmlns:m="http://schemas.openxmlformats.org/officeDocument/2006/math">
+                    <m:oMathParaPr>
+                      <m:jc m:val="centerGroup"/>
+                    </m:oMathParaPr>
+                    <m:oMath xmlns:m="http://schemas.openxmlformats.org/officeDocument/2006/math">
+                      <m:r>
+                        <a:rPr lang="en-US" i="1" dirty="0" smtClean="0">
+                          <a:solidFill>
+                            <a:schemeClr val="tx2"/>
+                          </a:solidFill>
+                          <a:latin typeface="Cambria Math" panose="02040503050406030204" pitchFamily="18" charset="0"/>
+                        </a:rPr>
+                        <m:t>𝑡</m:t>
+                      </m:r>
+                      <m:r>
+                        <a:rPr lang="en-US" i="1" dirty="0" smtClean="0">
+                          <a:solidFill>
+                            <a:schemeClr val="tx2"/>
+                          </a:solidFill>
+                          <a:latin typeface="Cambria Math" panose="02040503050406030204" pitchFamily="18" charset="0"/>
+                        </a:rPr>
+                        <m:t>=2.5</m:t>
+                      </m:r>
+                      <m:r>
+                        <a:rPr lang="en-US" i="1" dirty="0" smtClean="0">
+                          <a:solidFill>
+                            <a:schemeClr val="tx2"/>
+                          </a:solidFill>
+                          <a:latin typeface="Cambria Math" panose="02040503050406030204" pitchFamily="18" charset="0"/>
+                        </a:rPr>
+                        <m:t>𝑠</m:t>
+                      </m:r>
+                    </m:oMath>
+                  </m:oMathPara>
+                </a14:m>
+                <a:endParaRPr lang="en-US" dirty="0">
+                  <a:solidFill>
+                    <a:schemeClr val="tx2"/>
+                  </a:solidFill>
+                </a:endParaRPr>
+              </a:p>
+            </p:txBody>
+          </p:sp>
+        </mc:Choice>
+        <mc:Fallback>
+          <p:sp>
+            <p:nvSpPr>
+              <p:cNvPr id="19" name="TextBox 18">
+                <a:extLst>
+                  <a:ext uri="{FF2B5EF4-FFF2-40B4-BE49-F238E27FC236}">
+                    <a16:creationId xmlns:a16="http://schemas.microsoft.com/office/drawing/2014/main" id="{BF8A204D-F0B1-45A1-A867-35EEC9A95509}"/>
+                  </a:ext>
+                </a:extLst>
+              </p:cNvPr>
+              <p:cNvSpPr txBox="1">
+                <a:spLocks noRot="1" noChangeAspect="1" noMove="1" noResize="1" noEditPoints="1" noAdjustHandles="1" noChangeArrowheads="1" noChangeShapeType="1" noTextEdit="1"/>
+              </p:cNvSpPr>
+              <p:nvPr/>
+            </p:nvSpPr>
+            <p:spPr>
+              <a:xfrm>
+                <a:off x="6381750" y="3912710"/>
+                <a:ext cx="1052660" cy="369332"/>
+              </a:xfrm>
+              <a:prstGeom prst="rect">
+                <a:avLst/>
+              </a:prstGeom>
+              <a:blipFill>
+                <a:blip r:embed="rId3"/>
+                <a:stretch>
+                  <a:fillRect/>
+                </a:stretch>
+              </a:blipFill>
+            </p:spPr>
+            <p:txBody>
+              <a:bodyPr/>
+              <a:lstStyle/>
+              <a:p>
+                <a:r>
+                  <a:rPr lang="en-US">
+                    <a:noFill/>
+                  </a:rPr>
+                  <a:t> </a:t>
+                </a:r>
+              </a:p>
+            </p:txBody>
+          </p:sp>
+        </mc:Fallback>
+      </mc:AlternateContent>
+    </p:spTree>
+    <p:extLst>
+      <p:ext uri="{BB962C8B-B14F-4D97-AF65-F5344CB8AC3E}">
+        <p14:creationId xmlns:p14="http://schemas.microsoft.com/office/powerpoint/2010/main" val="3508186079"/>
+      </p:ext>
+    </p:extLst>
+  </p:cSld>
+  <p:clrMapOvr>
+    <a:masterClrMapping/>
+  </p:clrMapOvr>
+</p:sld>
+</file>
+
+<file path=ppt/slides/slide14.xml><?xml version="1.0" encoding="utf-8"?>
 <p:sld xmlns:a="http://schemas.openxmlformats.org/drawingml/2006/main" xmlns:r="http://schemas.openxmlformats.org/officeDocument/2006/relationships" xmlns:p="http://schemas.openxmlformats.org/presentationml/2006/main">
   <p:cSld>
     <p:spTree>
@@ -10510,9 +11160,12 @@
 </file>
 
 <file path=customXml/item1.xml><?xml version="1.0" encoding="utf-8"?>
-<p:properties xmlns:p="http://schemas.microsoft.com/office/2006/metadata/properties" xmlns:xsi="http://www.w3.org/2001/XMLSchema-instance" xmlns:pc="http://schemas.microsoft.com/office/infopath/2007/PartnerControls">
-  <documentManagement/>
-</p:properties>
+<?mso-contentType ?>
+<FormTemplates xmlns="http://schemas.microsoft.com/sharepoint/v3/contenttype/forms">
+  <Display>DocumentLibraryForm</Display>
+  <Edit>DocumentLibraryForm</Edit>
+  <New>DocumentLibraryForm</New>
+</FormTemplates>
 </file>
 
 <file path=customXml/item2.xml><?xml version="1.0" encoding="utf-8"?>
@@ -10733,19 +11386,15 @@
 </file>
 
 <file path=customXml/item3.xml><?xml version="1.0" encoding="utf-8"?>
-<?mso-contentType ?>
-<FormTemplates xmlns="http://schemas.microsoft.com/sharepoint/v3/contenttype/forms">
-  <Display>DocumentLibraryForm</Display>
-  <Edit>DocumentLibraryForm</Edit>
-  <New>DocumentLibraryForm</New>
-</FormTemplates>
+<p:properties xmlns:p="http://schemas.microsoft.com/office/2006/metadata/properties" xmlns:xsi="http://www.w3.org/2001/XMLSchema-instance" xmlns:pc="http://schemas.microsoft.com/office/infopath/2007/PartnerControls">
+  <documentManagement/>
+</p:properties>
 </file>
 
 <file path=customXml/itemProps1.xml><?xml version="1.0" encoding="utf-8"?>
-<ds:datastoreItem xmlns:ds="http://schemas.openxmlformats.org/officeDocument/2006/customXml" ds:itemID="{52EB1464-66D1-425A-BBB5-7A9312BBE9C4}">
+<ds:datastoreItem xmlns:ds="http://schemas.openxmlformats.org/officeDocument/2006/customXml" ds:itemID="{F5CF5F32-56DC-4068-8B04-457CF34A96F3}">
   <ds:schemaRefs>
-    <ds:schemaRef ds:uri="http://schemas.microsoft.com/office/2006/metadata/properties"/>
-    <ds:schemaRef ds:uri="http://schemas.microsoft.com/office/infopath/2007/PartnerControls"/>
+    <ds:schemaRef ds:uri="http://schemas.microsoft.com/sharepoint/v3/contenttype/forms"/>
   </ds:schemaRefs>
 </ds:datastoreItem>
 </file>
@@ -10770,9 +11419,10 @@
 </file>
 
 <file path=customXml/itemProps3.xml><?xml version="1.0" encoding="utf-8"?>
-<ds:datastoreItem xmlns:ds="http://schemas.openxmlformats.org/officeDocument/2006/customXml" ds:itemID="{F5CF5F32-56DC-4068-8B04-457CF34A96F3}">
+<ds:datastoreItem xmlns:ds="http://schemas.openxmlformats.org/officeDocument/2006/customXml" ds:itemID="{52EB1464-66D1-425A-BBB5-7A9312BBE9C4}">
   <ds:schemaRefs>
-    <ds:schemaRef ds:uri="http://schemas.microsoft.com/sharepoint/v3/contenttype/forms"/>
+    <ds:schemaRef ds:uri="http://schemas.microsoft.com/office/2006/metadata/properties"/>
+    <ds:schemaRef ds:uri="http://schemas.microsoft.com/office/infopath/2007/PartnerControls"/>
   </ds:schemaRefs>
 </ds:datastoreItem>
 </file>
</xml_diff>